<commit_message>
A few last minute changes
</commit_message>
<xml_diff>
--- a/Machine_Learning_of_Phishing_URL_Data.pptx
+++ b/Machine_Learning_of_Phishing_URL_Data.pptx
@@ -147,7 +147,7 @@
 <p1510:revInfo xmlns:a="http://schemas.openxmlformats.org/drawingml/2006/main" xmlns:r="http://schemas.openxmlformats.org/officeDocument/2006/relationships" xmlns:p1510="http://schemas.microsoft.com/office/powerpoint/2015/10/main">
   <p1510:revLst>
     <p1510:client id="{2547943C-568B-2A46-ABAE-DAB533A7F127}" v="4" dt="2024-09-10T21:56:53.681"/>
-    <p1510:client id="{863C22E1-F733-4C43-8702-40CCF77D7DF7}" v="27" dt="2024-09-11T00:46:11.404"/>
+    <p1510:client id="{863C22E1-F733-4C43-8702-40CCF77D7DF7}" v="40" dt="2024-09-11T20:12:19.189"/>
   </p1510:revLst>
 </p1510:revInfo>
 </file>
@@ -157,7 +157,7 @@
   <pc:docChgLst>
     <pc:chgData name="Brian Campbell" userId="a27f3cf3f583021c" providerId="LiveId" clId="{863C22E1-F733-4C43-8702-40CCF77D7DF7}"/>
     <pc:docChg chg="undo custSel addSld delSld modSld sldOrd modMainMaster">
-      <pc:chgData name="Brian Campbell" userId="a27f3cf3f583021c" providerId="LiveId" clId="{863C22E1-F733-4C43-8702-40CCF77D7DF7}" dt="2024-09-11T00:46:16.878" v="5356" actId="404"/>
+      <pc:chgData name="Brian Campbell" userId="a27f3cf3f583021c" providerId="LiveId" clId="{863C22E1-F733-4C43-8702-40CCF77D7DF7}" dt="2024-09-11T20:13:33.235" v="5785" actId="20577"/>
       <pc:docMkLst>
         <pc:docMk/>
       </pc:docMkLst>
@@ -914,7 +914,7 @@
         </pc:graphicFrameChg>
       </pc:sldChg>
       <pc:sldChg chg="modSp new mod">
-        <pc:chgData name="Brian Campbell" userId="a27f3cf3f583021c" providerId="LiveId" clId="{863C22E1-F733-4C43-8702-40CCF77D7DF7}" dt="2024-09-11T00:42:33.792" v="5352" actId="20577"/>
+        <pc:chgData name="Brian Campbell" userId="a27f3cf3f583021c" providerId="LiveId" clId="{863C22E1-F733-4C43-8702-40CCF77D7DF7}" dt="2024-09-11T15:11:20.844" v="5648" actId="20577"/>
         <pc:sldMkLst>
           <pc:docMk/>
           <pc:sldMk cId="3305554935" sldId="280"/>
@@ -928,7 +928,7 @@
           </ac:spMkLst>
         </pc:spChg>
         <pc:spChg chg="mod">
-          <ac:chgData name="Brian Campbell" userId="a27f3cf3f583021c" providerId="LiveId" clId="{863C22E1-F733-4C43-8702-40CCF77D7DF7}" dt="2024-09-11T00:42:33.792" v="5352" actId="20577"/>
+          <ac:chgData name="Brian Campbell" userId="a27f3cf3f583021c" providerId="LiveId" clId="{863C22E1-F733-4C43-8702-40CCF77D7DF7}" dt="2024-09-11T15:11:20.844" v="5648" actId="20577"/>
           <ac:spMkLst>
             <pc:docMk/>
             <pc:sldMk cId="3305554935" sldId="280"/>
@@ -1038,8 +1038,8 @@
           </ac:picMkLst>
         </pc:picChg>
       </pc:sldChg>
-      <pc:sldChg chg="modSp add mod">
-        <pc:chgData name="Brian Campbell" userId="a27f3cf3f583021c" providerId="LiveId" clId="{863C22E1-F733-4C43-8702-40CCF77D7DF7}" dt="2024-09-11T00:36:38.747" v="5099" actId="20577"/>
+      <pc:sldChg chg="addSp modSp add mod">
+        <pc:chgData name="Brian Campbell" userId="a27f3cf3f583021c" providerId="LiveId" clId="{863C22E1-F733-4C43-8702-40CCF77D7DF7}" dt="2024-09-11T20:13:33.235" v="5785" actId="20577"/>
         <pc:sldMkLst>
           <pc:docMk/>
           <pc:sldMk cId="724179986" sldId="283"/>
@@ -1052,8 +1052,16 @@
             <ac:spMk id="2" creationId="{06CB0E9C-39E0-4F0E-11F4-572B207791A6}"/>
           </ac:spMkLst>
         </pc:spChg>
-        <pc:graphicFrameChg chg="modGraphic">
-          <ac:chgData name="Brian Campbell" userId="a27f3cf3f583021c" providerId="LiveId" clId="{863C22E1-F733-4C43-8702-40CCF77D7DF7}" dt="2024-09-11T00:36:38.747" v="5099" actId="20577"/>
+        <pc:spChg chg="add mod">
+          <ac:chgData name="Brian Campbell" userId="a27f3cf3f583021c" providerId="LiveId" clId="{863C22E1-F733-4C43-8702-40CCF77D7DF7}" dt="2024-09-11T14:58:17.397" v="5401" actId="1076"/>
+          <ac:spMkLst>
+            <pc:docMk/>
+            <pc:sldMk cId="724179986" sldId="283"/>
+            <ac:spMk id="3" creationId="{B87D319F-064C-9D60-526B-C7EC3E1580B5}"/>
+          </ac:spMkLst>
+        </pc:spChg>
+        <pc:graphicFrameChg chg="mod modGraphic">
+          <ac:chgData name="Brian Campbell" userId="a27f3cf3f583021c" providerId="LiveId" clId="{863C22E1-F733-4C43-8702-40CCF77D7DF7}" dt="2024-09-11T20:13:33.235" v="5785" actId="20577"/>
           <ac:graphicFrameMkLst>
             <pc:docMk/>
             <pc:sldMk cId="724179986" sldId="283"/>
@@ -1500,7 +1508,7 @@
           <a:p>
             <a:fld id="{C8D18E60-4300-4729-A0D7-6AB984C3922D}" type="datetimeFigureOut">
               <a:rPr lang="en-US" smtClean="0"/>
-              <a:t>9/10/24</a:t>
+              <a:t>9/11/24</a:t>
             </a:fld>
             <a:endParaRPr lang="en-US"/>
           </a:p>
@@ -2315,7 +2323,7 @@
             <a:fld id="{53074F12-AA26-4AC8-9962-C36BB8F32554}" type="datetimeFigureOut">
               <a:rPr lang="en-US" smtClean="0"/>
               <a:pPr/>
-              <a:t>9/10/24</a:t>
+              <a:t>9/11/24</a:t>
             </a:fld>
             <a:endParaRPr lang="en-US"/>
           </a:p>
@@ -2569,7 +2577,7 @@
             <a:fld id="{53074F12-AA26-4AC8-9962-C36BB8F32554}" type="datetimeFigureOut">
               <a:rPr lang="en-US" smtClean="0"/>
               <a:pPr/>
-              <a:t>9/10/24</a:t>
+              <a:t>9/11/24</a:t>
             </a:fld>
             <a:endParaRPr lang="en-US"/>
           </a:p>
@@ -2739,7 +2747,7 @@
             <a:fld id="{53074F12-AA26-4AC8-9962-C36BB8F32554}" type="datetimeFigureOut">
               <a:rPr lang="en-US" smtClean="0"/>
               <a:pPr/>
-              <a:t>9/10/24</a:t>
+              <a:t>9/11/24</a:t>
             </a:fld>
             <a:endParaRPr lang="en-US"/>
           </a:p>
@@ -2919,7 +2927,7 @@
             <a:fld id="{53074F12-AA26-4AC8-9962-C36BB8F32554}" type="datetimeFigureOut">
               <a:rPr lang="en-US" smtClean="0"/>
               <a:pPr/>
-              <a:t>9/10/24</a:t>
+              <a:t>9/11/24</a:t>
             </a:fld>
             <a:endParaRPr lang="en-US"/>
           </a:p>
@@ -3211,7 +3219,7 @@
             <a:fld id="{53074F12-AA26-4AC8-9962-C36BB8F32554}" type="datetimeFigureOut">
               <a:rPr lang="en-US" smtClean="0"/>
               <a:pPr/>
-              <a:t>9/10/24</a:t>
+              <a:t>9/11/24</a:t>
             </a:fld>
             <a:endParaRPr lang="en-US"/>
           </a:p>
@@ -3458,7 +3466,7 @@
             <a:fld id="{53074F12-AA26-4AC8-9962-C36BB8F32554}" type="datetimeFigureOut">
               <a:rPr lang="en-US" smtClean="0"/>
               <a:pPr/>
-              <a:t>9/10/24</a:t>
+              <a:t>9/11/24</a:t>
             </a:fld>
             <a:endParaRPr lang="en-US"/>
           </a:p>
@@ -3705,7 +3713,7 @@
             <a:fld id="{53074F12-AA26-4AC8-9962-C36BB8F32554}" type="datetimeFigureOut">
               <a:rPr lang="en-US" smtClean="0"/>
               <a:pPr/>
-              <a:t>9/10/24</a:t>
+              <a:t>9/11/24</a:t>
             </a:fld>
             <a:endParaRPr lang="en-US"/>
           </a:p>
@@ -3992,7 +4000,7 @@
             <a:fld id="{53074F12-AA26-4AC8-9962-C36BB8F32554}" type="datetimeFigureOut">
               <a:rPr lang="en-US" smtClean="0"/>
               <a:pPr/>
-              <a:t>9/10/24</a:t>
+              <a:t>9/11/24</a:t>
             </a:fld>
             <a:endParaRPr lang="en-US"/>
           </a:p>
@@ -4503,7 +4511,7 @@
             <a:fld id="{53074F12-AA26-4AC8-9962-C36BB8F32554}" type="datetimeFigureOut">
               <a:rPr lang="en-US" smtClean="0"/>
               <a:pPr/>
-              <a:t>9/10/24</a:t>
+              <a:t>9/11/24</a:t>
             </a:fld>
             <a:endParaRPr lang="en-US"/>
           </a:p>
@@ -4622,7 +4630,7 @@
             <a:fld id="{53074F12-AA26-4AC8-9962-C36BB8F32554}" type="datetimeFigureOut">
               <a:rPr lang="en-US" smtClean="0"/>
               <a:pPr/>
-              <a:t>9/10/24</a:t>
+              <a:t>9/11/24</a:t>
             </a:fld>
             <a:endParaRPr lang="en-US"/>
           </a:p>
@@ -4719,7 +4727,7 @@
             <a:fld id="{53074F12-AA26-4AC8-9962-C36BB8F32554}" type="datetimeFigureOut">
               <a:rPr lang="en-US" smtClean="0"/>
               <a:pPr/>
-              <a:t>9/10/24</a:t>
+              <a:t>9/11/24</a:t>
             </a:fld>
             <a:endParaRPr lang="en-US"/>
           </a:p>
@@ -4996,7 +5004,7 @@
             <a:fld id="{53074F12-AA26-4AC8-9962-C36BB8F32554}" type="datetimeFigureOut">
               <a:rPr lang="en-US" smtClean="0"/>
               <a:pPr/>
-              <a:t>9/10/24</a:t>
+              <a:t>9/11/24</a:t>
             </a:fld>
             <a:endParaRPr lang="en-US"/>
           </a:p>
@@ -5218,7 +5226,7 @@
             <a:fld id="{53074F12-AA26-4AC8-9962-C36BB8F32554}" type="datetimeFigureOut">
               <a:rPr lang="en-US" smtClean="0"/>
               <a:pPr/>
-              <a:t>9/10/24</a:t>
+              <a:t>9/11/24</a:t>
             </a:fld>
             <a:endParaRPr lang="en-US"/>
           </a:p>
@@ -7351,14 +7359,14 @@
           <p:nvPr>
             <p:extLst>
               <p:ext uri="{D42A27DB-BD31-4B8C-83A1-F6EECF244321}">
-                <p14:modId xmlns:p14="http://schemas.microsoft.com/office/powerpoint/2010/main" val="3210321663"/>
+                <p14:modId xmlns:p14="http://schemas.microsoft.com/office/powerpoint/2010/main" val="2339028772"/>
               </p:ext>
             </p:extLst>
           </p:nvPr>
         </p:nvGraphicFramePr>
         <p:xfrm>
           <a:off x="457200" y="1655520"/>
-          <a:ext cx="8246070" cy="3337560"/>
+          <a:ext cx="8246070" cy="3127170"/>
         </p:xfrm>
         <a:graphic>
           <a:graphicData uri="http://schemas.openxmlformats.org/drawingml/2006/table">
@@ -7389,7 +7397,7 @@
                   </a:extLst>
                 </a:gridCol>
               </a:tblGrid>
-              <a:tr h="370840">
+              <a:tr h="331799">
                 <a:tc>
                   <a:txBody>
                     <a:bodyPr/>
@@ -7441,16 +7449,46 @@
                   </a:ext>
                 </a:extLst>
               </a:tr>
-              <a:tr h="370840">
+              <a:tr h="307835">
                 <a:tc>
                   <a:txBody>
                     <a:bodyPr/>
                     <a:lstStyle/>
                     <a:p>
+                      <a:pPr marL="0" marR="0" lvl="0" indent="0" algn="l" defTabSz="914400" rtl="0" eaLnBrk="1" fontAlgn="auto" latinLnBrk="0" hangingPunct="1">
+                        <a:lnSpc>
+                          <a:spcPct val="100000"/>
+                        </a:lnSpc>
+                        <a:spcBef>
+                          <a:spcPts val="0"/>
+                        </a:spcBef>
+                        <a:spcAft>
+                          <a:spcPts val="0"/>
+                        </a:spcAft>
+                        <a:buClrTx/>
+                        <a:buSzTx/>
+                        <a:buFontTx/>
+                        <a:buNone/>
+                        <a:tabLst/>
+                        <a:defRPr/>
+                      </a:pPr>
                       <a:r>
                         <a:rPr lang="en-US" sz="1200" dirty="0"/>
-                        <a:t>Easiest to use</a:t>
+                        <a:t>Not a fast as </a:t>
                       </a:r>
+                      <a:r>
+                        <a:rPr lang="en-US" sz="1200" dirty="0" err="1"/>
+                        <a:t>LightGBM</a:t>
+                      </a:r>
+                      <a:r>
+                        <a:rPr lang="en-US" sz="1200" dirty="0"/>
+                        <a:t> or </a:t>
+                      </a:r>
+                      <a:r>
+                        <a:rPr lang="en-US" sz="1200" dirty="0" err="1"/>
+                        <a:t>XGBoost</a:t>
+                      </a:r>
+                      <a:endParaRPr lang="en-US" sz="1200" dirty="0"/>
                     </a:p>
                   </a:txBody>
                   <a:tcPr/>
@@ -7487,13 +7525,33 @@
                   </a:ext>
                 </a:extLst>
               </a:tr>
-              <a:tr h="370840">
+              <a:tr h="307835">
                 <a:tc>
                   <a:txBody>
                     <a:bodyPr/>
                     <a:lstStyle/>
                     <a:p>
-                      <a:endParaRPr lang="en-US" sz="1200" dirty="0"/>
+                      <a:pPr marL="0" marR="0" lvl="0" indent="0" algn="l" defTabSz="914400" rtl="0" eaLnBrk="1" fontAlgn="auto" latinLnBrk="0" hangingPunct="1">
+                        <a:lnSpc>
+                          <a:spcPct val="100000"/>
+                        </a:lnSpc>
+                        <a:spcBef>
+                          <a:spcPts val="0"/>
+                        </a:spcBef>
+                        <a:spcAft>
+                          <a:spcPts val="0"/>
+                        </a:spcAft>
+                        <a:buClrTx/>
+                        <a:buSzTx/>
+                        <a:buFontTx/>
+                        <a:buNone/>
+                        <a:tabLst/>
+                        <a:defRPr/>
+                      </a:pPr>
+                      <a:r>
+                        <a:rPr lang="en-US" sz="1200" dirty="0"/>
+                        <a:t>Easiest to use</a:t>
+                      </a:r>
                     </a:p>
                   </a:txBody>
                   <a:tcPr/>
@@ -7516,7 +7574,27 @@
                     <a:bodyPr/>
                     <a:lstStyle/>
                     <a:p>
-                      <a:endParaRPr lang="en-US" sz="1200" dirty="0"/>
+                      <a:pPr marL="0" marR="0" lvl="0" indent="0" algn="l" defTabSz="914400" rtl="0" eaLnBrk="1" fontAlgn="auto" latinLnBrk="0" hangingPunct="1">
+                        <a:lnSpc>
+                          <a:spcPct val="100000"/>
+                        </a:lnSpc>
+                        <a:spcBef>
+                          <a:spcPts val="0"/>
+                        </a:spcBef>
+                        <a:spcAft>
+                          <a:spcPts val="0"/>
+                        </a:spcAft>
+                        <a:buClrTx/>
+                        <a:buSzTx/>
+                        <a:buFontTx/>
+                        <a:buNone/>
+                        <a:tabLst/>
+                        <a:defRPr/>
+                      </a:pPr>
+                      <a:r>
+                        <a:rPr lang="en-US" sz="1200" dirty="0"/>
+                        <a:t>Medium level ease of use</a:t>
+                      </a:r>
                     </a:p>
                   </a:txBody>
                   <a:tcPr/>
@@ -7527,12 +7605,182 @@
                   </a:ext>
                 </a:extLst>
               </a:tr>
-              <a:tr h="370840">
+              <a:tr h="414748">
                 <a:tc>
                   <a:txBody>
                     <a:bodyPr/>
                     <a:lstStyle/>
                     <a:p>
+                      <a:r>
+                        <a:rPr lang="en-US" sz="1200" dirty="0"/>
+                        <a:t>Not as configurable as </a:t>
+                      </a:r>
+                      <a:r>
+                        <a:rPr lang="en-US" sz="1200" dirty="0" err="1"/>
+                        <a:t>LightGBM</a:t>
+                      </a:r>
+                      <a:r>
+                        <a:rPr lang="en-US" sz="1200" dirty="0"/>
+                        <a:t> or </a:t>
+                      </a:r>
+                      <a:r>
+                        <a:rPr lang="en-US" sz="1200" dirty="0" err="1"/>
+                        <a:t>XGBoost</a:t>
+                      </a:r>
+                      <a:r>
+                        <a:rPr lang="en-US" sz="1200" dirty="0"/>
+                        <a:t>*</a:t>
+                      </a:r>
+                    </a:p>
+                  </a:txBody>
+                  <a:tcPr/>
+                </a:tc>
+                <a:tc>
+                  <a:txBody>
+                    <a:bodyPr/>
+                    <a:lstStyle/>
+                    <a:p>
+                      <a:r>
+                        <a:rPr lang="en-US" sz="1200" dirty="0"/>
+                        <a:t>Highly configurable*</a:t>
+                      </a:r>
+                    </a:p>
+                  </a:txBody>
+                  <a:tcPr/>
+                </a:tc>
+                <a:tc>
+                  <a:txBody>
+                    <a:bodyPr/>
+                    <a:lstStyle/>
+                    <a:p>
+                      <a:pPr marL="0" marR="0" lvl="0" indent="0" algn="l" defTabSz="914400" rtl="0" eaLnBrk="1" fontAlgn="auto" latinLnBrk="0" hangingPunct="1">
+                        <a:lnSpc>
+                          <a:spcPct val="100000"/>
+                        </a:lnSpc>
+                        <a:spcBef>
+                          <a:spcPts val="0"/>
+                        </a:spcBef>
+                        <a:spcAft>
+                          <a:spcPts val="0"/>
+                        </a:spcAft>
+                        <a:buClrTx/>
+                        <a:buSzTx/>
+                        <a:buFontTx/>
+                        <a:buNone/>
+                        <a:tabLst/>
+                        <a:defRPr/>
+                      </a:pPr>
+                      <a:r>
+                        <a:rPr lang="en-US" sz="1200" dirty="0"/>
+                        <a:t>Highly configurable*</a:t>
+                      </a:r>
+                    </a:p>
+                    <a:p>
+                      <a:endParaRPr lang="en-US" sz="1200" dirty="0"/>
+                    </a:p>
+                  </a:txBody>
+                  <a:tcPr/>
+                </a:tc>
+                <a:extLst>
+                  <a:ext uri="{0D108BD9-81ED-4DB2-BD59-A6C34878D82A}">
+                    <a16:rowId xmlns:a16="http://schemas.microsoft.com/office/drawing/2014/main" val="2084686757"/>
+                  </a:ext>
+                </a:extLst>
+              </a:tr>
+              <a:tr h="307835">
+                <a:tc>
+                  <a:txBody>
+                    <a:bodyPr/>
+                    <a:lstStyle/>
+                    <a:p>
+                      <a:pPr marL="0" marR="0" lvl="0" indent="0" algn="l" defTabSz="914400" rtl="0" eaLnBrk="1" fontAlgn="auto" latinLnBrk="0" hangingPunct="1">
+                        <a:lnSpc>
+                          <a:spcPct val="100000"/>
+                        </a:lnSpc>
+                        <a:spcBef>
+                          <a:spcPts val="0"/>
+                        </a:spcBef>
+                        <a:spcAft>
+                          <a:spcPts val="0"/>
+                        </a:spcAft>
+                        <a:buClrTx/>
+                        <a:buSzTx/>
+                        <a:buFontTx/>
+                        <a:buNone/>
+                        <a:tabLst/>
+                        <a:defRPr/>
+                      </a:pPr>
+                      <a:r>
+                        <a:rPr lang="en-US" sz="1200" dirty="0"/>
+                        <a:t>Most accurate</a:t>
+                      </a:r>
+                    </a:p>
+                  </a:txBody>
+                  <a:tcPr/>
+                </a:tc>
+                <a:tc>
+                  <a:txBody>
+                    <a:bodyPr/>
+                    <a:lstStyle/>
+                    <a:p>
+                      <a:r>
+                        <a:rPr lang="en-US" sz="1200" dirty="0"/>
+                        <a:t>Less accurate than other models</a:t>
+                      </a:r>
+                    </a:p>
+                  </a:txBody>
+                  <a:tcPr/>
+                </a:tc>
+                <a:tc>
+                  <a:txBody>
+                    <a:bodyPr/>
+                    <a:lstStyle/>
+                    <a:p>
+                      <a:r>
+                        <a:rPr lang="en-US" sz="1200" dirty="0"/>
+                        <a:t>Most accurate</a:t>
+                      </a:r>
+                    </a:p>
+                  </a:txBody>
+                  <a:tcPr/>
+                </a:tc>
+                <a:extLst>
+                  <a:ext uri="{0D108BD9-81ED-4DB2-BD59-A6C34878D82A}">
+                    <a16:rowId xmlns:a16="http://schemas.microsoft.com/office/drawing/2014/main" val="1914916541"/>
+                  </a:ext>
+                </a:extLst>
+              </a:tr>
+              <a:tr h="307835">
+                <a:tc>
+                  <a:txBody>
+                    <a:bodyPr/>
+                    <a:lstStyle/>
+                    <a:p>
+                      <a:pPr marL="0" marR="0" lvl="0" indent="0" algn="l" defTabSz="914400" rtl="0" eaLnBrk="1" fontAlgn="auto" latinLnBrk="0" hangingPunct="1">
+                        <a:lnSpc>
+                          <a:spcPct val="100000"/>
+                        </a:lnSpc>
+                        <a:spcBef>
+                          <a:spcPts val="0"/>
+                        </a:spcBef>
+                        <a:spcAft>
+                          <a:spcPts val="0"/>
+                        </a:spcAft>
+                        <a:buClrTx/>
+                        <a:buSzTx/>
+                        <a:buFontTx/>
+                        <a:buNone/>
+                        <a:tabLst/>
+                        <a:defRPr/>
+                      </a:pPr>
+                      <a:r>
+                        <a:rPr lang="en-US" sz="1200" dirty="0"/>
+                        <a:t>Results nearly identical to </a:t>
+                      </a:r>
+                      <a:r>
+                        <a:rPr lang="en-US" sz="1200" dirty="0" err="1"/>
+                        <a:t>XGBoost</a:t>
+                      </a:r>
                       <a:endParaRPr lang="en-US" sz="1200" dirty="0"/>
                     </a:p>
                   </a:txBody>
@@ -7545,34 +7793,20 @@
                     <a:p>
                       <a:r>
                         <a:rPr lang="en-US" sz="1200" dirty="0"/>
-                        <a:t>Highly configurable</a:t>
+                        <a:t>Different results than </a:t>
                       </a:r>
-                    </a:p>
-                  </a:txBody>
-                  <a:tcPr/>
-                </a:tc>
-                <a:tc>
-                  <a:txBody>
-                    <a:bodyPr/>
-                    <a:lstStyle/>
-                    <a:p>
-                      <a:endParaRPr lang="en-US" sz="1200" dirty="0"/>
-                    </a:p>
-                  </a:txBody>
-                  <a:tcPr/>
-                </a:tc>
-                <a:extLst>
-                  <a:ext uri="{0D108BD9-81ED-4DB2-BD59-A6C34878D82A}">
-                    <a16:rowId xmlns:a16="http://schemas.microsoft.com/office/drawing/2014/main" val="2084686757"/>
-                  </a:ext>
-                </a:extLst>
-              </a:tr>
-              <a:tr h="370840">
-                <a:tc>
-                  <a:txBody>
-                    <a:bodyPr/>
-                    <a:lstStyle/>
-                    <a:p>
+                      <a:r>
+                        <a:rPr lang="en-US" sz="1200" dirty="0" err="1"/>
+                        <a:t>LightGBM</a:t>
+                      </a:r>
+                      <a:r>
+                        <a:rPr lang="en-US" sz="1200" dirty="0"/>
+                        <a:t> or </a:t>
+                      </a:r>
+                      <a:r>
+                        <a:rPr lang="en-US" sz="1200" dirty="0" err="1"/>
+                        <a:t>XGBoost</a:t>
+                      </a:r>
                       <a:endParaRPr lang="en-US" sz="1200" dirty="0"/>
                     </a:p>
                   </a:txBody>
@@ -7583,53 +7817,14 @@
                     <a:bodyPr/>
                     <a:lstStyle/>
                     <a:p>
-                      <a:endParaRPr lang="en-US" sz="1200" dirty="0"/>
-                    </a:p>
-                  </a:txBody>
-                  <a:tcPr/>
-                </a:tc>
-                <a:tc>
-                  <a:txBody>
-                    <a:bodyPr/>
-                    <a:lstStyle/>
-                    <a:p>
-                      <a:endParaRPr lang="en-US" sz="1200" dirty="0"/>
-                    </a:p>
-                  </a:txBody>
-                  <a:tcPr/>
-                </a:tc>
-                <a:extLst>
-                  <a:ext uri="{0D108BD9-81ED-4DB2-BD59-A6C34878D82A}">
-                    <a16:rowId xmlns:a16="http://schemas.microsoft.com/office/drawing/2014/main" val="1914916541"/>
-                  </a:ext>
-                </a:extLst>
-              </a:tr>
-              <a:tr h="370840">
-                <a:tc>
-                  <a:txBody>
-                    <a:bodyPr/>
-                    <a:lstStyle/>
-                    <a:p>
-                      <a:endParaRPr lang="en-US" sz="1200" dirty="0"/>
-                    </a:p>
-                  </a:txBody>
-                  <a:tcPr/>
-                </a:tc>
-                <a:tc>
-                  <a:txBody>
-                    <a:bodyPr/>
-                    <a:lstStyle/>
-                    <a:p>
-                      <a:endParaRPr lang="en-US" sz="1200" dirty="0"/>
-                    </a:p>
-                  </a:txBody>
-                  <a:tcPr/>
-                </a:tc>
-                <a:tc>
-                  <a:txBody>
-                    <a:bodyPr/>
-                    <a:lstStyle/>
-                    <a:p>
+                      <a:r>
+                        <a:rPr lang="en-US" sz="1200" dirty="0"/>
+                        <a:t>Results nearly identical to </a:t>
+                      </a:r>
+                      <a:r>
+                        <a:rPr lang="en-US" sz="1200" dirty="0" err="1"/>
+                        <a:t>RandomForest</a:t>
+                      </a:r>
                       <a:endParaRPr lang="en-US" sz="1200" dirty="0"/>
                     </a:p>
                   </a:txBody>
@@ -7641,7 +7836,7 @@
                   </a:ext>
                 </a:extLst>
               </a:tr>
-              <a:tr h="370840">
+              <a:tr h="307835">
                 <a:tc>
                   <a:txBody>
                     <a:bodyPr/>
@@ -7678,7 +7873,7 @@
                   </a:ext>
                 </a:extLst>
               </a:tr>
-              <a:tr h="370840">
+              <a:tr h="307835">
                 <a:tc>
                   <a:txBody>
                     <a:bodyPr/>
@@ -7715,7 +7910,7 @@
                   </a:ext>
                 </a:extLst>
               </a:tr>
-              <a:tr h="370840">
+              <a:tr h="307835">
                 <a:tc>
                   <a:txBody>
                     <a:bodyPr/>
@@ -7756,6 +7951,42 @@
           </a:graphicData>
         </a:graphic>
       </p:graphicFrame>
+      <p:sp>
+        <p:nvSpPr>
+          <p:cNvPr id="3" name="TextBox 2">
+            <a:extLst>
+              <a:ext uri="{FF2B5EF4-FFF2-40B4-BE49-F238E27FC236}">
+                <a16:creationId xmlns:a16="http://schemas.microsoft.com/office/drawing/2014/main" id="{B87D319F-064C-9D60-526B-C7EC3E1580B5}"/>
+              </a:ext>
+            </a:extLst>
+          </p:cNvPr>
+          <p:cNvSpPr txBox="1"/>
+          <p:nvPr/>
+        </p:nvSpPr>
+        <p:spPr>
+          <a:xfrm>
+            <a:off x="7271468" y="4792544"/>
+            <a:ext cx="1431802" cy="215444"/>
+          </a:xfrm>
+          <a:prstGeom prst="rect">
+            <a:avLst/>
+          </a:prstGeom>
+          <a:noFill/>
+        </p:spPr>
+        <p:txBody>
+          <a:bodyPr wrap="none" rtlCol="0">
+            <a:spAutoFit/>
+          </a:bodyPr>
+          <a:lstStyle/>
+          <a:p>
+            <a:r>
+              <a:rPr lang="en-US" sz="800" dirty="0"/>
+              <a:t>*based on current experience</a:t>
+            </a:r>
+            <a:endParaRPr lang="en-US" dirty="0"/>
+          </a:p>
+        </p:txBody>
+      </p:sp>
     </p:spTree>
     <p:extLst>
       <p:ext uri="{BB962C8B-B14F-4D97-AF65-F5344CB8AC3E}">
@@ -7832,7 +8063,9 @@
         </p:nvSpPr>
         <p:spPr/>
         <p:txBody>
-          <a:bodyPr/>
+          <a:bodyPr>
+            <a:normAutofit lnSpcReduction="10000"/>
+          </a:bodyPr>
           <a:lstStyle/>
           <a:p>
             <a:r>
@@ -7863,6 +8096,13 @@
             <a:r>
               <a:rPr lang="en-US" dirty="0"/>
               <a:t>Email gateways</a:t>
+            </a:r>
+          </a:p>
+          <a:p>
+            <a:pPr lvl="1"/>
+            <a:r>
+              <a:rPr lang="en-US" dirty="0"/>
+              <a:t>Use in our Threat Intelligence</a:t>
             </a:r>
           </a:p>
         </p:txBody>

</xml_diff>